<commit_message>
refactor(javascript-fp): renamed a title
</commit_message>
<xml_diff>
--- a/javascript-fp/slides.pptx
+++ b/javascript-fp/slides.pptx
@@ -463,7 +463,7 @@
           <a:p>
             <a:fld id="{D1E75726-000A-0345-A7E0-1FF46595DB89}" type="datetimeFigureOut">
               <a:rPr lang="fr-FR" smtClean="0"/>
-              <a:t>01/02/2020</a:t>
+              <a:t>04/02/2020</a:t>
             </a:fld>
             <a:endParaRPr lang="fr-FR"/>
           </a:p>
@@ -1849,10 +1849,9 @@
               <a:t>orderProductsOfCategoryByCreationDate</a:t>
             </a:r>
             <a:r>
-              <a:rPr lang="en-US"/>
+              <a:rPr lang="en-US" dirty="0"/>
               <a:t>)(%250A%2520%2520%2520%2520enormousProductsDataSet%252C%250A%2520%2520%2520%2520%2522Yaourts%2522%250A)%253B%250A%250A%252F%252F%2520no%2520repetition%252C%2520no%2520filtering%2520for%2520each%2520call%250AorderYaourtsByCreationDate()%253B%250AorderYaourtsByCreationDate(%2522desc%2522)%253B%250A%2520%2520</a:t>
             </a:r>
-            <a:endParaRPr lang="en-US" dirty="0"/>
           </a:p>
         </p:txBody>
       </p:sp>
@@ -28419,7 +28418,7 @@
           <a:p>
             <a:r>
               <a:rPr lang="fr-FR" dirty="0"/>
-              <a:t>Management of </a:t>
+              <a:t>Isolation of </a:t>
             </a:r>
             <a:br>
               <a:rPr lang="fr-FR" dirty="0"/>
@@ -33185,7 +33184,7 @@
             </a:pPr>
             <a:r>
               <a:rPr lang="fr-FR" dirty="0"/>
-              <a:t>Management of side effects</a:t>
+              <a:t>Isolation of side effects</a:t>
             </a:r>
           </a:p>
           <a:p>

</xml_diff>

<commit_message>
refactor(javascript-fp): switched some slides and removed one
</commit_message>
<xml_diff>
--- a/javascript-fp/slides.pptx
+++ b/javascript-fp/slides.pptx
@@ -5,10 +5,10 @@
     <p:sldMasterId id="2147483659" r:id="rId1"/>
   </p:sldMasterIdLst>
   <p:notesMasterIdLst>
-    <p:notesMasterId r:id="rId22"/>
+    <p:notesMasterId r:id="rId21"/>
   </p:notesMasterIdLst>
   <p:handoutMasterIdLst>
-    <p:handoutMasterId r:id="rId23"/>
+    <p:handoutMasterId r:id="rId22"/>
   </p:handoutMasterIdLst>
   <p:sldIdLst>
     <p:sldId id="361" r:id="rId2"/>
@@ -25,12 +25,11 @@
     <p:sldId id="387" r:id="rId13"/>
     <p:sldId id="374" r:id="rId14"/>
     <p:sldId id="379" r:id="rId15"/>
-    <p:sldId id="380" r:id="rId16"/>
-    <p:sldId id="381" r:id="rId17"/>
-    <p:sldId id="382" r:id="rId18"/>
-    <p:sldId id="370" r:id="rId19"/>
-    <p:sldId id="389" r:id="rId20"/>
-    <p:sldId id="360" r:id="rId21"/>
+    <p:sldId id="381" r:id="rId16"/>
+    <p:sldId id="382" r:id="rId17"/>
+    <p:sldId id="370" r:id="rId18"/>
+    <p:sldId id="389" r:id="rId19"/>
+    <p:sldId id="360" r:id="rId20"/>
   </p:sldIdLst>
   <p:sldSz cx="9144000" cy="5715000" type="screen16x10"/>
   <p:notesSz cx="6858000" cy="9144000"/>
@@ -28638,7 +28637,7 @@
         <p:spPr>
           <a:xfrm>
             <a:off x="968376" y="2137420"/>
-            <a:ext cx="7060008" cy="2520280"/>
+            <a:ext cx="7204024" cy="2520280"/>
           </a:xfrm>
           <a:prstGeom prst="rect">
             <a:avLst/>
@@ -28923,7 +28922,7 @@
                 <a:ea typeface="Graphik Medium" charset="0"/>
                 <a:cs typeface="Graphik Medium" charset="0"/>
               </a:rPr>
-              <a:t>multiply by a random number </a:t>
+              <a:t>multiply by a random number, </a:t>
             </a:r>
             <a:r>
               <a:rPr lang="fr-FR" sz="1800" b="0" dirty="0">
@@ -29220,538 +29219,6 @@
           </a:p>
         </p:txBody>
       </p:sp>
-      <p:sp>
-        <p:nvSpPr>
-          <p:cNvPr id="5" name="Titre 1">
-            <a:extLst>
-              <a:ext uri="{FF2B5EF4-FFF2-40B4-BE49-F238E27FC236}">
-                <a16:creationId xmlns:a16="http://schemas.microsoft.com/office/drawing/2014/main" id="{1B6C8325-3132-4993-9262-D1A8AEB8192E}"/>
-              </a:ext>
-            </a:extLst>
-          </p:cNvPr>
-          <p:cNvSpPr txBox="1">
-            <a:spLocks/>
-          </p:cNvSpPr>
-          <p:nvPr/>
-        </p:nvSpPr>
-        <p:spPr>
-          <a:xfrm>
-            <a:off x="968376" y="2137420"/>
-            <a:ext cx="7060008" cy="2520280"/>
-          </a:xfrm>
-          <a:prstGeom prst="rect">
-            <a:avLst/>
-          </a:prstGeom>
-          <a:noFill/>
-          <a:ln>
-            <a:noFill/>
-          </a:ln>
-        </p:spPr>
-        <p:txBody>
-          <a:bodyPr spcFirstLastPara="1" wrap="square" lIns="0" tIns="0" rIns="0" bIns="0" anchor="t" anchorCtr="0"/>
-          <a:lstStyle>
-            <a:defPPr marR="0" lvl="0" algn="l" rtl="0">
-              <a:lnSpc>
-                <a:spcPct val="100000"/>
-              </a:lnSpc>
-              <a:spcBef>
-                <a:spcPts val="0"/>
-              </a:spcBef>
-              <a:spcAft>
-                <a:spcPts val="0"/>
-              </a:spcAft>
-            </a:defPPr>
-            <a:lvl1pPr marR="0" lvl="0" algn="l" rtl="0">
-              <a:lnSpc>
-                <a:spcPct val="100000"/>
-              </a:lnSpc>
-              <a:spcBef>
-                <a:spcPts val="0"/>
-              </a:spcBef>
-              <a:spcAft>
-                <a:spcPts val="0"/>
-              </a:spcAft>
-              <a:buClr>
-                <a:schemeClr val="dk1"/>
-              </a:buClr>
-              <a:buSzPts val="2800"/>
-              <a:buNone/>
-              <a:defRPr sz="2400" b="1" i="0" u="none" strike="noStrike" cap="none" baseline="0">
-                <a:solidFill>
-                  <a:schemeClr val="bg2"/>
-                </a:solidFill>
-                <a:latin typeface="Graphik Bold" panose="020B0503030202060203" pitchFamily="34" charset="77"/>
-                <a:ea typeface="Graphik Bold" panose="020B0503030202060203" pitchFamily="34" charset="77"/>
-                <a:cs typeface="Graphik Bold" panose="020B0503030202060203" pitchFamily="34" charset="77"/>
-                <a:sym typeface="Arial"/>
-              </a:defRPr>
-            </a:lvl1pPr>
-            <a:lvl2pPr lvl="1">
-              <a:spcBef>
-                <a:spcPts val="0"/>
-              </a:spcBef>
-              <a:spcAft>
-                <a:spcPts val="0"/>
-              </a:spcAft>
-              <a:buClr>
-                <a:schemeClr val="dk1"/>
-              </a:buClr>
-              <a:buSzPts val="2800"/>
-              <a:buNone/>
-              <a:defRPr sz="2800">
-                <a:solidFill>
-                  <a:schemeClr val="dk1"/>
-                </a:solidFill>
-              </a:defRPr>
-            </a:lvl2pPr>
-            <a:lvl3pPr lvl="2">
-              <a:spcBef>
-                <a:spcPts val="0"/>
-              </a:spcBef>
-              <a:spcAft>
-                <a:spcPts val="0"/>
-              </a:spcAft>
-              <a:buClr>
-                <a:schemeClr val="dk1"/>
-              </a:buClr>
-              <a:buSzPts val="2800"/>
-              <a:buNone/>
-              <a:defRPr sz="2800">
-                <a:solidFill>
-                  <a:schemeClr val="dk1"/>
-                </a:solidFill>
-              </a:defRPr>
-            </a:lvl3pPr>
-            <a:lvl4pPr lvl="3">
-              <a:spcBef>
-                <a:spcPts val="0"/>
-              </a:spcBef>
-              <a:spcAft>
-                <a:spcPts val="0"/>
-              </a:spcAft>
-              <a:buClr>
-                <a:schemeClr val="dk1"/>
-              </a:buClr>
-              <a:buSzPts val="2800"/>
-              <a:buNone/>
-              <a:defRPr sz="2800">
-                <a:solidFill>
-                  <a:schemeClr val="dk1"/>
-                </a:solidFill>
-              </a:defRPr>
-            </a:lvl4pPr>
-            <a:lvl5pPr lvl="4">
-              <a:spcBef>
-                <a:spcPts val="0"/>
-              </a:spcBef>
-              <a:spcAft>
-                <a:spcPts val="0"/>
-              </a:spcAft>
-              <a:buClr>
-                <a:schemeClr val="dk1"/>
-              </a:buClr>
-              <a:buSzPts val="2800"/>
-              <a:buNone/>
-              <a:defRPr sz="2800">
-                <a:solidFill>
-                  <a:schemeClr val="dk1"/>
-                </a:solidFill>
-              </a:defRPr>
-            </a:lvl5pPr>
-            <a:lvl6pPr lvl="5">
-              <a:spcBef>
-                <a:spcPts val="0"/>
-              </a:spcBef>
-              <a:spcAft>
-                <a:spcPts val="0"/>
-              </a:spcAft>
-              <a:buClr>
-                <a:schemeClr val="dk1"/>
-              </a:buClr>
-              <a:buSzPts val="2800"/>
-              <a:buNone/>
-              <a:defRPr sz="2800">
-                <a:solidFill>
-                  <a:schemeClr val="dk1"/>
-                </a:solidFill>
-              </a:defRPr>
-            </a:lvl6pPr>
-            <a:lvl7pPr lvl="6">
-              <a:spcBef>
-                <a:spcPts val="0"/>
-              </a:spcBef>
-              <a:spcAft>
-                <a:spcPts val="0"/>
-              </a:spcAft>
-              <a:buClr>
-                <a:schemeClr val="dk1"/>
-              </a:buClr>
-              <a:buSzPts val="2800"/>
-              <a:buNone/>
-              <a:defRPr sz="2800">
-                <a:solidFill>
-                  <a:schemeClr val="dk1"/>
-                </a:solidFill>
-              </a:defRPr>
-            </a:lvl7pPr>
-            <a:lvl8pPr lvl="7">
-              <a:spcBef>
-                <a:spcPts val="0"/>
-              </a:spcBef>
-              <a:spcAft>
-                <a:spcPts val="0"/>
-              </a:spcAft>
-              <a:buClr>
-                <a:schemeClr val="dk1"/>
-              </a:buClr>
-              <a:buSzPts val="2800"/>
-              <a:buNone/>
-              <a:defRPr sz="2800">
-                <a:solidFill>
-                  <a:schemeClr val="dk1"/>
-                </a:solidFill>
-              </a:defRPr>
-            </a:lvl8pPr>
-            <a:lvl9pPr lvl="8">
-              <a:spcBef>
-                <a:spcPts val="0"/>
-              </a:spcBef>
-              <a:spcAft>
-                <a:spcPts val="0"/>
-              </a:spcAft>
-              <a:buClr>
-                <a:schemeClr val="dk1"/>
-              </a:buClr>
-              <a:buSzPts val="2800"/>
-              <a:buNone/>
-              <a:defRPr sz="2800">
-                <a:solidFill>
-                  <a:schemeClr val="dk1"/>
-                </a:solidFill>
-              </a:defRPr>
-            </a:lvl9pPr>
-          </a:lstStyle>
-          <a:p>
-            <a:r>
-              <a:rPr lang="fr-FR" sz="1500" b="0" dirty="0">
-                <a:solidFill>
-                  <a:schemeClr val="tx1"/>
-                </a:solidFill>
-                <a:latin typeface="Graphik Extralight" panose="020B0303030202060203" pitchFamily="34" charset="0"/>
-                <a:ea typeface="Graphik Medium" charset="0"/>
-                <a:cs typeface="Graphik Medium" charset="0"/>
-              </a:rPr>
-              <a:t>01.</a:t>
-            </a:r>
-            <a:r>
-              <a:rPr lang="fr-FR" sz="3000" b="0" dirty="0">
-                <a:solidFill>
-                  <a:schemeClr val="tx1"/>
-                </a:solidFill>
-                <a:latin typeface="Graphik Bold" panose="020B0803030202060203" pitchFamily="34" charset="0"/>
-                <a:ea typeface="Graphik Medium" charset="0"/>
-                <a:cs typeface="Graphik Medium" charset="0"/>
-              </a:rPr>
-              <a:t>  fetch Bordeaux’s temp, </a:t>
-            </a:r>
-          </a:p>
-          <a:p>
-            <a:r>
-              <a:rPr lang="fr-FR" sz="1500" b="0" dirty="0">
-                <a:latin typeface="Graphik Extralight" panose="020B0303030202060203" pitchFamily="34" charset="0"/>
-                <a:ea typeface="Graphik Medium" charset="0"/>
-                <a:cs typeface="Graphik Medium" charset="0"/>
-              </a:rPr>
-              <a:t>02.</a:t>
-            </a:r>
-            <a:r>
-              <a:rPr lang="fr-FR" sz="3200" b="0" dirty="0">
-                <a:latin typeface="Graphik Extralight" panose="020B0303030202060203" pitchFamily="34" charset="0"/>
-                <a:ea typeface="Graphik Medium" charset="0"/>
-                <a:cs typeface="Graphik Medium" charset="0"/>
-              </a:rPr>
-              <a:t> </a:t>
-            </a:r>
-            <a:r>
-              <a:rPr lang="fr-FR" sz="3000" b="0" dirty="0">
-                <a:latin typeface="Graphik Bold" panose="020B0803030202060203" pitchFamily="34" charset="0"/>
-                <a:ea typeface="Graphik Medium" charset="0"/>
-                <a:cs typeface="Graphik Medium" charset="0"/>
-              </a:rPr>
-              <a:t>convert it to Celsius,</a:t>
-            </a:r>
-            <a:r>
-              <a:rPr lang="fr-FR" sz="3000" b="0" dirty="0">
-                <a:solidFill>
-                  <a:schemeClr val="tx1"/>
-                </a:solidFill>
-                <a:latin typeface="Graphik Bold" panose="020B0803030202060203" pitchFamily="34" charset="0"/>
-                <a:ea typeface="Graphik Medium" charset="0"/>
-                <a:cs typeface="Graphik Medium" charset="0"/>
-              </a:rPr>
-              <a:t>                      </a:t>
-            </a:r>
-            <a:r>
-              <a:rPr lang="fr-FR" sz="3000" b="0" dirty="0">
-                <a:latin typeface="Graphik Extralight" panose="020B0303030202060203" pitchFamily="34" charset="0"/>
-                <a:ea typeface="Graphik Medium" charset="0"/>
-                <a:cs typeface="Graphik Medium" charset="0"/>
-                <a:sym typeface="Wingdings" panose="05000000000000000000" pitchFamily="2" charset="2"/>
-              </a:rPr>
-              <a:t> pure</a:t>
-            </a:r>
-            <a:endParaRPr lang="fr-FR" sz="3000" b="0" dirty="0">
-              <a:latin typeface="Graphik Extralight" panose="020B0303030202060203" pitchFamily="34" charset="0"/>
-              <a:ea typeface="Graphik Medium" charset="0"/>
-              <a:cs typeface="Graphik Medium" charset="0"/>
-            </a:endParaRPr>
-          </a:p>
-          <a:p>
-            <a:r>
-              <a:rPr lang="fr-FR" sz="1500" b="0" dirty="0">
-                <a:solidFill>
-                  <a:schemeClr val="tx1"/>
-                </a:solidFill>
-                <a:latin typeface="Graphik Extralight" panose="020B0303030202060203" pitchFamily="34" charset="0"/>
-                <a:ea typeface="Graphik Medium" charset="0"/>
-                <a:cs typeface="Graphik Medium" charset="0"/>
-              </a:rPr>
-              <a:t>03.</a:t>
-            </a:r>
-            <a:r>
-              <a:rPr lang="fr-FR" sz="3200" b="0" dirty="0">
-                <a:solidFill>
-                  <a:schemeClr val="tx1"/>
-                </a:solidFill>
-                <a:latin typeface="Graphik Bold" panose="020B0803030202060203" pitchFamily="34" charset="0"/>
-                <a:ea typeface="Graphik Medium" charset="0"/>
-                <a:cs typeface="Graphik Medium" charset="0"/>
-              </a:rPr>
-              <a:t> </a:t>
-            </a:r>
-            <a:r>
-              <a:rPr lang="fr-FR" sz="3000" b="0" dirty="0">
-                <a:solidFill>
-                  <a:schemeClr val="tx1"/>
-                </a:solidFill>
-                <a:latin typeface="Graphik Bold" panose="020B0803030202060203" pitchFamily="34" charset="0"/>
-                <a:ea typeface="Graphik Medium" charset="0"/>
-                <a:cs typeface="Graphik Medium" charset="0"/>
-              </a:rPr>
-              <a:t>multiply by a random number</a:t>
-            </a:r>
-          </a:p>
-          <a:p>
-            <a:r>
-              <a:rPr lang="fr-FR" sz="1500" b="0" dirty="0">
-                <a:solidFill>
-                  <a:schemeClr val="tx1"/>
-                </a:solidFill>
-                <a:latin typeface="Graphik Extralight" panose="020B0303030202060203" pitchFamily="34" charset="0"/>
-                <a:ea typeface="Graphik Medium" charset="0"/>
-                <a:cs typeface="Graphik Medium" charset="0"/>
-              </a:rPr>
-              <a:t>04.</a:t>
-            </a:r>
-            <a:r>
-              <a:rPr lang="fr-FR" sz="3200" b="0" dirty="0">
-                <a:solidFill>
-                  <a:schemeClr val="tx1"/>
-                </a:solidFill>
-                <a:latin typeface="Graphik Bold" panose="020B0803030202060203" pitchFamily="34" charset="0"/>
-                <a:ea typeface="Graphik Medium" charset="0"/>
-                <a:cs typeface="Graphik Medium" charset="0"/>
-              </a:rPr>
-              <a:t> </a:t>
-            </a:r>
-            <a:r>
-              <a:rPr lang="fr-FR" sz="3000" b="0" dirty="0">
-                <a:solidFill>
-                  <a:schemeClr val="tx1"/>
-                </a:solidFill>
-                <a:latin typeface="Graphik Bold" panose="020B0803030202060203" pitchFamily="34" charset="0"/>
-                <a:ea typeface="Graphik Medium" charset="0"/>
-                <a:cs typeface="Graphik Medium" charset="0"/>
-              </a:rPr>
-              <a:t>insert result into the DOM</a:t>
-            </a:r>
-            <a:r>
-              <a:rPr lang="fr-FR" sz="1800" b="0" dirty="0">
-                <a:solidFill>
-                  <a:schemeClr val="tx1"/>
-                </a:solidFill>
-                <a:latin typeface="Graphik Bold" panose="020B0803030202060203" pitchFamily="34" charset="0"/>
-                <a:ea typeface="Graphik Medium" charset="0"/>
-                <a:cs typeface="Graphik Medium" charset="0"/>
-              </a:rPr>
-              <a:t>. </a:t>
-            </a:r>
-          </a:p>
-        </p:txBody>
-      </p:sp>
-    </p:spTree>
-    <p:extLst>
-      <p:ext uri="{BB962C8B-B14F-4D97-AF65-F5344CB8AC3E}">
-        <p14:creationId xmlns:p14="http://schemas.microsoft.com/office/powerpoint/2010/main" val="3254143592"/>
-      </p:ext>
-    </p:extLst>
-  </p:cSld>
-  <p:clrMapOvr>
-    <a:masterClrMapping/>
-  </p:clrMapOvr>
-</p:sld>
-</file>
-
-<file path=ppt/slides/slide16.xml><?xml version="1.0" encoding="utf-8"?>
-<p:sld xmlns:a="http://schemas.openxmlformats.org/drawingml/2006/main" xmlns:r="http://schemas.openxmlformats.org/officeDocument/2006/relationships" xmlns:p="http://schemas.openxmlformats.org/presentationml/2006/main">
-  <p:cSld>
-    <p:spTree>
-      <p:nvGrpSpPr>
-        <p:cNvPr id="1" name=""/>
-        <p:cNvGrpSpPr/>
-        <p:nvPr/>
-      </p:nvGrpSpPr>
-      <p:grpSpPr>
-        <a:xfrm>
-          <a:off x="0" y="0"/>
-          <a:ext cx="0" cy="0"/>
-          <a:chOff x="0" y="0"/>
-          <a:chExt cx="0" cy="0"/>
-        </a:xfrm>
-      </p:grpSpPr>
-      <p:sp>
-        <p:nvSpPr>
-          <p:cNvPr id="2" name="Titre 1">
-            <a:extLst>
-              <a:ext uri="{FF2B5EF4-FFF2-40B4-BE49-F238E27FC236}">
-                <a16:creationId xmlns:a16="http://schemas.microsoft.com/office/drawing/2014/main" id="{A14FB6AB-FA62-E94F-B807-87F375E39546}"/>
-              </a:ext>
-            </a:extLst>
-          </p:cNvPr>
-          <p:cNvSpPr>
-            <a:spLocks noGrp="1"/>
-          </p:cNvSpPr>
-          <p:nvPr>
-            <p:ph type="title"/>
-          </p:nvPr>
-        </p:nvSpPr>
-        <p:spPr/>
-        <p:txBody>
-          <a:bodyPr/>
-          <a:lstStyle/>
-          <a:p>
-            <a:r>
-              <a:rPr lang="fr-FR" dirty="0">
-                <a:solidFill>
-                  <a:schemeClr val="bg2">
-                    <a:lumMod val="60000"/>
-                    <a:lumOff val="40000"/>
-                  </a:schemeClr>
-                </a:solidFill>
-              </a:rPr>
-              <a:t>Example: </a:t>
-            </a:r>
-            <a:br>
-              <a:rPr lang="fr-FR" dirty="0"/>
-            </a:br>
-            <a:r>
-              <a:rPr lang="fr-FR" dirty="0"/>
-              <a:t>OpenWeather2DOM</a:t>
-            </a:r>
-          </a:p>
-        </p:txBody>
-      </p:sp>
-      <p:sp>
-        <p:nvSpPr>
-          <p:cNvPr id="3" name="Espace réservé du numéro de diapositive 2">
-            <a:extLst>
-              <a:ext uri="{FF2B5EF4-FFF2-40B4-BE49-F238E27FC236}">
-                <a16:creationId xmlns:a16="http://schemas.microsoft.com/office/drawing/2014/main" id="{D297E5E3-398B-9248-8528-4963401455D3}"/>
-              </a:ext>
-            </a:extLst>
-          </p:cNvPr>
-          <p:cNvSpPr>
-            <a:spLocks noGrp="1"/>
-          </p:cNvSpPr>
-          <p:nvPr>
-            <p:ph type="sldNum" idx="14"/>
-          </p:nvPr>
-        </p:nvSpPr>
-        <p:spPr/>
-        <p:txBody>
-          <a:bodyPr/>
-          <a:lstStyle/>
-          <a:p>
-            <a:fld id="{00000000-1234-1234-1234-123412341234}" type="slidenum">
-              <a:rPr lang="uk-UA" smtClean="0"/>
-              <a:pPr/>
-              <a:t>16</a:t>
-            </a:fld>
-            <a:endParaRPr lang="uk-UA" dirty="0"/>
-          </a:p>
-        </p:txBody>
-      </p:sp>
-      <p:sp>
-        <p:nvSpPr>
-          <p:cNvPr id="7" name="Espace réservé du pied de page 17">
-            <a:extLst>
-              <a:ext uri="{FF2B5EF4-FFF2-40B4-BE49-F238E27FC236}">
-                <a16:creationId xmlns:a16="http://schemas.microsoft.com/office/drawing/2014/main" id="{7B5B71B8-7F7A-4C72-BD9E-D4EA294335C8}"/>
-              </a:ext>
-            </a:extLst>
-          </p:cNvPr>
-          <p:cNvSpPr>
-            <a:spLocks noGrp="1"/>
-          </p:cNvSpPr>
-          <p:nvPr>
-            <p:ph type="ftr" sz="quarter" idx="20"/>
-          </p:nvPr>
-        </p:nvSpPr>
-        <p:spPr>
-          <a:xfrm>
-            <a:off x="250825" y="5449788"/>
-            <a:ext cx="4680520" cy="144016"/>
-          </a:xfrm>
-        </p:spPr>
-        <p:txBody>
-          <a:bodyPr/>
-          <a:lstStyle/>
-          <a:p>
-            <a:r>
-              <a:rPr lang="fr-FR" dirty="0" err="1"/>
-              <a:t>Functional</a:t>
-            </a:r>
-            <a:r>
-              <a:rPr lang="fr-FR" dirty="0"/>
-              <a:t> </a:t>
-            </a:r>
-            <a:r>
-              <a:rPr lang="fr-FR" dirty="0" err="1"/>
-              <a:t>programming</a:t>
-            </a:r>
-            <a:r>
-              <a:rPr lang="fr-FR" dirty="0"/>
-              <a:t> in the JS </a:t>
-            </a:r>
-            <a:r>
-              <a:rPr lang="fr-FR" dirty="0" err="1"/>
-              <a:t>ecosystem</a:t>
-            </a:r>
-            <a:r>
-              <a:rPr lang="fr-FR" dirty="0"/>
-              <a:t> • v1 • 06/02/2020• </a:t>
-            </a:r>
-            <a:r>
-              <a:rPr lang="fr-FR" dirty="0" err="1"/>
-              <a:t>ekino</a:t>
-            </a:r>
-            <a:r>
-              <a:rPr lang="fr-FR" dirty="0"/>
-              <a:t> • Confidentiel</a:t>
-            </a:r>
-          </a:p>
-        </p:txBody>
-      </p:sp>
       <p:pic>
         <p:nvPicPr>
           <p:cNvPr id="11" name="Picture 10" descr="A screen shot of a computer&#10;&#10;Description automatically generated">
@@ -30042,7 +29509,7 @@
 </p:sld>
 </file>
 
-<file path=ppt/slides/slide17.xml><?xml version="1.0" encoding="utf-8"?>
+<file path=ppt/slides/slide16.xml><?xml version="1.0" encoding="utf-8"?>
 <p:sld xmlns:a="http://schemas.openxmlformats.org/drawingml/2006/main" xmlns:r="http://schemas.openxmlformats.org/officeDocument/2006/relationships" xmlns:p="http://schemas.openxmlformats.org/presentationml/2006/main">
   <p:cSld>
     <p:spTree>
@@ -30125,7 +29592,7 @@
             <a:fld id="{00000000-1234-1234-1234-123412341234}" type="slidenum">
               <a:rPr lang="uk-UA" smtClean="0"/>
               <a:pPr/>
-              <a:t>17</a:t>
+              <a:t>16</a:t>
             </a:fld>
             <a:endParaRPr lang="uk-UA" dirty="0"/>
           </a:p>
@@ -30482,6 +29949,109 @@
 </p:sld>
 </file>
 
+<file path=ppt/slides/slide17.xml><?xml version="1.0" encoding="utf-8"?>
+<p:sld xmlns:a="http://schemas.openxmlformats.org/drawingml/2006/main" xmlns:r="http://schemas.openxmlformats.org/officeDocument/2006/relationships" xmlns:p="http://schemas.openxmlformats.org/presentationml/2006/main">
+  <p:cSld>
+    <p:spTree>
+      <p:nvGrpSpPr>
+        <p:cNvPr id="1" name=""/>
+        <p:cNvGrpSpPr/>
+        <p:nvPr/>
+      </p:nvGrpSpPr>
+      <p:grpSpPr>
+        <a:xfrm>
+          <a:off x="0" y="0"/>
+          <a:ext cx="0" cy="0"/>
+          <a:chOff x="0" y="0"/>
+          <a:chExt cx="0" cy="0"/>
+        </a:xfrm>
+      </p:grpSpPr>
+      <p:sp>
+        <p:nvSpPr>
+          <p:cNvPr id="12" name="Titre 11">
+            <a:extLst>
+              <a:ext uri="{FF2B5EF4-FFF2-40B4-BE49-F238E27FC236}">
+                <a16:creationId xmlns:a16="http://schemas.microsoft.com/office/drawing/2014/main" id="{1C57B218-03C4-2543-86C7-D69BBD41779D}"/>
+              </a:ext>
+            </a:extLst>
+          </p:cNvPr>
+          <p:cNvSpPr>
+            <a:spLocks noGrp="1"/>
+          </p:cNvSpPr>
+          <p:nvPr>
+            <p:ph type="title"/>
+          </p:nvPr>
+        </p:nvSpPr>
+        <p:spPr/>
+        <p:txBody>
+          <a:bodyPr/>
+          <a:lstStyle/>
+          <a:p>
+            <a:r>
+              <a:rPr lang="fr-FR" dirty="0" err="1"/>
+              <a:t>Some</a:t>
+            </a:r>
+            <a:r>
+              <a:rPr lang="fr-FR" dirty="0"/>
+              <a:t> </a:t>
+            </a:r>
+            <a:r>
+              <a:rPr lang="fr-FR" dirty="0" err="1"/>
+              <a:t>helpful</a:t>
+            </a:r>
+            <a:r>
+              <a:rPr lang="fr-FR" dirty="0"/>
+              <a:t> </a:t>
+            </a:r>
+            <a:r>
+              <a:rPr lang="fr-FR" dirty="0" err="1"/>
+              <a:t>tools</a:t>
+            </a:r>
+            <a:endParaRPr lang="fr-FR" dirty="0"/>
+          </a:p>
+        </p:txBody>
+      </p:sp>
+      <p:sp>
+        <p:nvSpPr>
+          <p:cNvPr id="3" name="Espace réservé du texte 2">
+            <a:extLst>
+              <a:ext uri="{FF2B5EF4-FFF2-40B4-BE49-F238E27FC236}">
+                <a16:creationId xmlns:a16="http://schemas.microsoft.com/office/drawing/2014/main" id="{B05F9FA5-A94F-1B45-ABE8-DA70A5B4533B}"/>
+              </a:ext>
+            </a:extLst>
+          </p:cNvPr>
+          <p:cNvSpPr>
+            <a:spLocks noGrp="1"/>
+          </p:cNvSpPr>
+          <p:nvPr>
+            <p:ph type="body" sz="quarter" idx="13"/>
+          </p:nvPr>
+        </p:nvSpPr>
+        <p:spPr/>
+        <p:txBody>
+          <a:bodyPr/>
+          <a:lstStyle/>
+          <a:p>
+            <a:r>
+              <a:rPr lang="fr-FR" dirty="0"/>
+              <a:t>04.</a:t>
+            </a:r>
+          </a:p>
+        </p:txBody>
+      </p:sp>
+    </p:spTree>
+    <p:extLst>
+      <p:ext uri="{BB962C8B-B14F-4D97-AF65-F5344CB8AC3E}">
+        <p14:creationId xmlns:p14="http://schemas.microsoft.com/office/powerpoint/2010/main" val="2053677654"/>
+      </p:ext>
+    </p:extLst>
+  </p:cSld>
+  <p:clrMapOvr>
+    <a:masterClrMapping/>
+  </p:clrMapOvr>
+</p:sld>
+</file>
+
 <file path=ppt/slides/slide18.xml><?xml version="1.0" encoding="utf-8"?>
 <p:sld xmlns:a="http://schemas.openxmlformats.org/drawingml/2006/main" xmlns:r="http://schemas.openxmlformats.org/officeDocument/2006/relationships" xmlns:p="http://schemas.openxmlformats.org/presentationml/2006/main">
   <p:cSld>
@@ -30501,109 +30071,6 @@
       </p:grpSpPr>
       <p:sp>
         <p:nvSpPr>
-          <p:cNvPr id="12" name="Titre 11">
-            <a:extLst>
-              <a:ext uri="{FF2B5EF4-FFF2-40B4-BE49-F238E27FC236}">
-                <a16:creationId xmlns:a16="http://schemas.microsoft.com/office/drawing/2014/main" id="{1C57B218-03C4-2543-86C7-D69BBD41779D}"/>
-              </a:ext>
-            </a:extLst>
-          </p:cNvPr>
-          <p:cNvSpPr>
-            <a:spLocks noGrp="1"/>
-          </p:cNvSpPr>
-          <p:nvPr>
-            <p:ph type="title"/>
-          </p:nvPr>
-        </p:nvSpPr>
-        <p:spPr/>
-        <p:txBody>
-          <a:bodyPr/>
-          <a:lstStyle/>
-          <a:p>
-            <a:r>
-              <a:rPr lang="fr-FR" dirty="0" err="1"/>
-              <a:t>Some</a:t>
-            </a:r>
-            <a:r>
-              <a:rPr lang="fr-FR" dirty="0"/>
-              <a:t> </a:t>
-            </a:r>
-            <a:r>
-              <a:rPr lang="fr-FR" dirty="0" err="1"/>
-              <a:t>helpful</a:t>
-            </a:r>
-            <a:r>
-              <a:rPr lang="fr-FR" dirty="0"/>
-              <a:t> </a:t>
-            </a:r>
-            <a:r>
-              <a:rPr lang="fr-FR" dirty="0" err="1"/>
-              <a:t>tools</a:t>
-            </a:r>
-            <a:endParaRPr lang="fr-FR" dirty="0"/>
-          </a:p>
-        </p:txBody>
-      </p:sp>
-      <p:sp>
-        <p:nvSpPr>
-          <p:cNvPr id="3" name="Espace réservé du texte 2">
-            <a:extLst>
-              <a:ext uri="{FF2B5EF4-FFF2-40B4-BE49-F238E27FC236}">
-                <a16:creationId xmlns:a16="http://schemas.microsoft.com/office/drawing/2014/main" id="{B05F9FA5-A94F-1B45-ABE8-DA70A5B4533B}"/>
-              </a:ext>
-            </a:extLst>
-          </p:cNvPr>
-          <p:cNvSpPr>
-            <a:spLocks noGrp="1"/>
-          </p:cNvSpPr>
-          <p:nvPr>
-            <p:ph type="body" sz="quarter" idx="13"/>
-          </p:nvPr>
-        </p:nvSpPr>
-        <p:spPr/>
-        <p:txBody>
-          <a:bodyPr/>
-          <a:lstStyle/>
-          <a:p>
-            <a:r>
-              <a:rPr lang="fr-FR" dirty="0"/>
-              <a:t>04.</a:t>
-            </a:r>
-          </a:p>
-        </p:txBody>
-      </p:sp>
-    </p:spTree>
-    <p:extLst>
-      <p:ext uri="{BB962C8B-B14F-4D97-AF65-F5344CB8AC3E}">
-        <p14:creationId xmlns:p14="http://schemas.microsoft.com/office/powerpoint/2010/main" val="2053677654"/>
-      </p:ext>
-    </p:extLst>
-  </p:cSld>
-  <p:clrMapOvr>
-    <a:masterClrMapping/>
-  </p:clrMapOvr>
-</p:sld>
-</file>
-
-<file path=ppt/slides/slide19.xml><?xml version="1.0" encoding="utf-8"?>
-<p:sld xmlns:a="http://schemas.openxmlformats.org/drawingml/2006/main" xmlns:r="http://schemas.openxmlformats.org/officeDocument/2006/relationships" xmlns:p="http://schemas.openxmlformats.org/presentationml/2006/main">
-  <p:cSld>
-    <p:spTree>
-      <p:nvGrpSpPr>
-        <p:cNvPr id="1" name=""/>
-        <p:cNvGrpSpPr/>
-        <p:nvPr/>
-      </p:nvGrpSpPr>
-      <p:grpSpPr>
-        <a:xfrm>
-          <a:off x="0" y="0"/>
-          <a:ext cx="0" cy="0"/>
-          <a:chOff x="0" y="0"/>
-          <a:chExt cx="0" cy="0"/>
-        </a:xfrm>
-      </p:grpSpPr>
-      <p:sp>
-        <p:nvSpPr>
           <p:cNvPr id="3" name="Espace réservé du numéro de diapositive 2">
             <a:extLst>
               <a:ext uri="{FF2B5EF4-FFF2-40B4-BE49-F238E27FC236}">
@@ -30631,7 +30098,7 @@
             <a:fld id="{00000000-1234-1234-1234-123412341234}" type="slidenum">
               <a:rPr lang="uk-UA" smtClean="0"/>
               <a:pPr/>
-              <a:t>19</a:t>
+              <a:t>18</a:t>
             </a:fld>
             <a:endParaRPr lang="uk-UA" dirty="0"/>
           </a:p>
@@ -32988,367 +32455,7 @@
 </p:sld>
 </file>
 
-<file path=ppt/slides/slide2.xml><?xml version="1.0" encoding="utf-8"?>
-<p:sld xmlns:a="http://schemas.openxmlformats.org/drawingml/2006/main" xmlns:r="http://schemas.openxmlformats.org/officeDocument/2006/relationships" xmlns:p="http://schemas.openxmlformats.org/presentationml/2006/main">
-  <p:cSld>
-    <p:spTree>
-      <p:nvGrpSpPr>
-        <p:cNvPr id="1" name=""/>
-        <p:cNvGrpSpPr/>
-        <p:nvPr/>
-      </p:nvGrpSpPr>
-      <p:grpSpPr>
-        <a:xfrm>
-          <a:off x="0" y="0"/>
-          <a:ext cx="0" cy="0"/>
-          <a:chOff x="0" y="0"/>
-          <a:chExt cx="0" cy="0"/>
-        </a:xfrm>
-      </p:grpSpPr>
-      <p:sp>
-        <p:nvSpPr>
-          <p:cNvPr id="2" name="Titre 1">
-            <a:extLst>
-              <a:ext uri="{FF2B5EF4-FFF2-40B4-BE49-F238E27FC236}">
-                <a16:creationId xmlns:a16="http://schemas.microsoft.com/office/drawing/2014/main" id="{FA19FF96-7DD0-0040-828B-A523CF6F7D83}"/>
-              </a:ext>
-            </a:extLst>
-          </p:cNvPr>
-          <p:cNvSpPr>
-            <a:spLocks noGrp="1"/>
-          </p:cNvSpPr>
-          <p:nvPr>
-            <p:ph type="ctrTitle"/>
-          </p:nvPr>
-        </p:nvSpPr>
-        <p:spPr/>
-        <p:txBody>
-          <a:bodyPr/>
-          <a:lstStyle/>
-          <a:p>
-            <a:r>
-              <a:rPr lang="fr-FR" dirty="0"/>
-              <a:t>Contents</a:t>
-            </a:r>
-          </a:p>
-        </p:txBody>
-      </p:sp>
-      <p:sp>
-        <p:nvSpPr>
-          <p:cNvPr id="3" name="Espace réservé du numéro de diapositive 2">
-            <a:extLst>
-              <a:ext uri="{FF2B5EF4-FFF2-40B4-BE49-F238E27FC236}">
-                <a16:creationId xmlns:a16="http://schemas.microsoft.com/office/drawing/2014/main" id="{41B4FBCF-B1E9-524A-BD98-8FCB15B72B21}"/>
-              </a:ext>
-            </a:extLst>
-          </p:cNvPr>
-          <p:cNvSpPr>
-            <a:spLocks noGrp="1"/>
-          </p:cNvSpPr>
-          <p:nvPr>
-            <p:ph type="sldNum" idx="19"/>
-          </p:nvPr>
-        </p:nvSpPr>
-        <p:spPr/>
-        <p:txBody>
-          <a:bodyPr/>
-          <a:lstStyle/>
-          <a:p>
-            <a:fld id="{00000000-1234-1234-1234-123412341234}" type="slidenum">
-              <a:rPr lang="uk-UA" smtClean="0"/>
-              <a:pPr/>
-              <a:t>2</a:t>
-            </a:fld>
-            <a:endParaRPr lang="uk-UA" dirty="0"/>
-          </a:p>
-        </p:txBody>
-      </p:sp>
-      <p:sp>
-        <p:nvSpPr>
-          <p:cNvPr id="5" name="Sous-titre 4">
-            <a:extLst>
-              <a:ext uri="{FF2B5EF4-FFF2-40B4-BE49-F238E27FC236}">
-                <a16:creationId xmlns:a16="http://schemas.microsoft.com/office/drawing/2014/main" id="{30997316-F276-E841-A8C1-A7469BDAC93D}"/>
-              </a:ext>
-            </a:extLst>
-          </p:cNvPr>
-          <p:cNvSpPr>
-            <a:spLocks noGrp="1"/>
-          </p:cNvSpPr>
-          <p:nvPr>
-            <p:ph type="subTitle" idx="1"/>
-          </p:nvPr>
-        </p:nvSpPr>
-        <p:spPr>
-          <a:xfrm>
-            <a:off x="968375" y="1441449"/>
-            <a:ext cx="588963" cy="3216251"/>
-          </a:xfrm>
-        </p:spPr>
-        <p:txBody>
-          <a:bodyPr/>
-          <a:lstStyle/>
-          <a:p>
-            <a:pPr>
-              <a:lnSpc>
-                <a:spcPct val="200000"/>
-              </a:lnSpc>
-            </a:pPr>
-            <a:r>
-              <a:rPr lang="fr-FR" dirty="0"/>
-              <a:t>01.</a:t>
-            </a:r>
-          </a:p>
-          <a:p>
-            <a:pPr>
-              <a:lnSpc>
-                <a:spcPct val="200000"/>
-              </a:lnSpc>
-            </a:pPr>
-            <a:r>
-              <a:rPr lang="fr-FR" dirty="0"/>
-              <a:t>02.</a:t>
-            </a:r>
-          </a:p>
-          <a:p>
-            <a:pPr>
-              <a:lnSpc>
-                <a:spcPct val="200000"/>
-              </a:lnSpc>
-            </a:pPr>
-            <a:r>
-              <a:rPr lang="fr-FR" dirty="0"/>
-              <a:t>03.</a:t>
-            </a:r>
-          </a:p>
-          <a:p>
-            <a:pPr>
-              <a:lnSpc>
-                <a:spcPct val="200000"/>
-              </a:lnSpc>
-            </a:pPr>
-            <a:r>
-              <a:rPr lang="fr-FR" dirty="0"/>
-              <a:t>04.</a:t>
-            </a:r>
-          </a:p>
-        </p:txBody>
-      </p:sp>
-      <p:sp>
-        <p:nvSpPr>
-          <p:cNvPr id="6" name="Espace réservé du texte 5">
-            <a:extLst>
-              <a:ext uri="{FF2B5EF4-FFF2-40B4-BE49-F238E27FC236}">
-                <a16:creationId xmlns:a16="http://schemas.microsoft.com/office/drawing/2014/main" id="{63FDBA37-F74B-7F40-9B6B-6CE160C0EE6C}"/>
-              </a:ext>
-            </a:extLst>
-          </p:cNvPr>
-          <p:cNvSpPr>
-            <a:spLocks noGrp="1"/>
-          </p:cNvSpPr>
-          <p:nvPr>
-            <p:ph type="body" sz="quarter" idx="14"/>
-          </p:nvPr>
-        </p:nvSpPr>
-        <p:spPr/>
-        <p:txBody>
-          <a:bodyPr/>
-          <a:lstStyle/>
-          <a:p>
-            <a:pPr>
-              <a:lnSpc>
-                <a:spcPct val="200000"/>
-              </a:lnSpc>
-            </a:pPr>
-            <a:r>
-              <a:rPr lang="fr-FR" dirty="0"/>
-              <a:t>Principles of the functional paradigm</a:t>
-            </a:r>
-          </a:p>
-          <a:p>
-            <a:pPr>
-              <a:lnSpc>
-                <a:spcPct val="200000"/>
-              </a:lnSpc>
-            </a:pPr>
-            <a:r>
-              <a:rPr lang="fr-FR" dirty="0"/>
-              <a:t>Application of FP principles in JS</a:t>
-            </a:r>
-          </a:p>
-          <a:p>
-            <a:pPr>
-              <a:lnSpc>
-                <a:spcPct val="200000"/>
-              </a:lnSpc>
-            </a:pPr>
-            <a:r>
-              <a:rPr lang="fr-FR" dirty="0"/>
-              <a:t>Isolation of side effects</a:t>
-            </a:r>
-          </a:p>
-          <a:p>
-            <a:pPr>
-              <a:lnSpc>
-                <a:spcPct val="200000"/>
-              </a:lnSpc>
-            </a:pPr>
-            <a:r>
-              <a:rPr lang="fr-FR" dirty="0"/>
-              <a:t>Some helpful tools</a:t>
-            </a:r>
-          </a:p>
-          <a:p>
-            <a:pPr>
-              <a:lnSpc>
-                <a:spcPct val="200000"/>
-              </a:lnSpc>
-            </a:pPr>
-            <a:endParaRPr lang="fr-FR" dirty="0"/>
-          </a:p>
-        </p:txBody>
-      </p:sp>
-      <p:sp>
-        <p:nvSpPr>
-          <p:cNvPr id="7" name="Espace réservé du texte 6">
-            <a:extLst>
-              <a:ext uri="{FF2B5EF4-FFF2-40B4-BE49-F238E27FC236}">
-                <a16:creationId xmlns:a16="http://schemas.microsoft.com/office/drawing/2014/main" id="{80C71FCD-0534-EC4B-BE13-E4A579365A5E}"/>
-              </a:ext>
-            </a:extLst>
-          </p:cNvPr>
-          <p:cNvSpPr>
-            <a:spLocks noGrp="1"/>
-          </p:cNvSpPr>
-          <p:nvPr>
-            <p:ph type="body" sz="quarter" idx="18"/>
-          </p:nvPr>
-        </p:nvSpPr>
-        <p:spPr>
-          <a:xfrm>
-            <a:off x="6850064" y="1467755"/>
-            <a:ext cx="1325562" cy="3507480"/>
-          </a:xfrm>
-        </p:spPr>
-        <p:txBody>
-          <a:bodyPr/>
-          <a:lstStyle/>
-          <a:p>
-            <a:pPr>
-              <a:lnSpc>
-                <a:spcPct val="250000"/>
-              </a:lnSpc>
-            </a:pPr>
-            <a:r>
-              <a:rPr lang="fr-FR" dirty="0"/>
-              <a:t> p.03–06</a:t>
-            </a:r>
-          </a:p>
-          <a:p>
-            <a:pPr>
-              <a:lnSpc>
-                <a:spcPct val="250000"/>
-              </a:lnSpc>
-            </a:pPr>
-            <a:r>
-              <a:rPr lang="fr-FR" dirty="0"/>
-              <a:t>  p.07–12</a:t>
-            </a:r>
-          </a:p>
-          <a:p>
-            <a:pPr>
-              <a:lnSpc>
-                <a:spcPct val="250000"/>
-              </a:lnSpc>
-            </a:pPr>
-            <a:r>
-              <a:rPr lang="fr-FR" dirty="0"/>
-              <a:t>  p.13–17</a:t>
-            </a:r>
-          </a:p>
-          <a:p>
-            <a:pPr>
-              <a:lnSpc>
-                <a:spcPct val="250000"/>
-              </a:lnSpc>
-            </a:pPr>
-            <a:r>
-              <a:rPr lang="fr-FR" dirty="0"/>
-              <a:t>p.18–19</a:t>
-            </a:r>
-          </a:p>
-        </p:txBody>
-      </p:sp>
-      <p:sp>
-        <p:nvSpPr>
-          <p:cNvPr id="18" name="Espace réservé du pied de page 17">
-            <a:extLst>
-              <a:ext uri="{FF2B5EF4-FFF2-40B4-BE49-F238E27FC236}">
-                <a16:creationId xmlns:a16="http://schemas.microsoft.com/office/drawing/2014/main" id="{25377960-2AE1-9843-8D95-33879CD98993}"/>
-              </a:ext>
-            </a:extLst>
-          </p:cNvPr>
-          <p:cNvSpPr>
-            <a:spLocks noGrp="1"/>
-          </p:cNvSpPr>
-          <p:nvPr>
-            <p:ph type="ftr" sz="quarter" idx="20"/>
-          </p:nvPr>
-        </p:nvSpPr>
-        <p:spPr/>
-        <p:txBody>
-          <a:bodyPr/>
-          <a:lstStyle/>
-          <a:p>
-            <a:r>
-              <a:rPr lang="fr-FR" dirty="0" err="1"/>
-              <a:t>Functional</a:t>
-            </a:r>
-            <a:r>
-              <a:rPr lang="fr-FR" dirty="0"/>
-              <a:t> </a:t>
-            </a:r>
-            <a:r>
-              <a:rPr lang="fr-FR" dirty="0" err="1"/>
-              <a:t>programming</a:t>
-            </a:r>
-            <a:r>
-              <a:rPr lang="fr-FR" dirty="0"/>
-              <a:t> in the JS </a:t>
-            </a:r>
-            <a:r>
-              <a:rPr lang="fr-FR" dirty="0" err="1"/>
-              <a:t>ecosystem</a:t>
-            </a:r>
-            <a:r>
-              <a:rPr lang="fr-FR" dirty="0"/>
-              <a:t> • v1 • 06/02/2020• </a:t>
-            </a:r>
-            <a:r>
-              <a:rPr lang="fr-FR" dirty="0" err="1"/>
-              <a:t>ekino</a:t>
-            </a:r>
-            <a:r>
-              <a:rPr lang="fr-FR" dirty="0"/>
-              <a:t> • Confidentiel</a:t>
-            </a:r>
-          </a:p>
-        </p:txBody>
-      </p:sp>
-    </p:spTree>
-    <p:extLst>
-      <p:ext uri="{BB962C8B-B14F-4D97-AF65-F5344CB8AC3E}">
-        <p14:creationId xmlns:p14="http://schemas.microsoft.com/office/powerpoint/2010/main" val="2391288875"/>
-      </p:ext>
-    </p:extLst>
-  </p:cSld>
-  <p:clrMapOvr>
-    <a:masterClrMapping/>
-  </p:clrMapOvr>
-</p:sld>
-</file>
-
-<file path=ppt/slides/slide20.xml><?xml version="1.0" encoding="utf-8"?>
+<file path=ppt/slides/slide19.xml><?xml version="1.0" encoding="utf-8"?>
 <p:sld xmlns:a="http://schemas.openxmlformats.org/drawingml/2006/main" xmlns:r="http://schemas.openxmlformats.org/officeDocument/2006/relationships" xmlns:p="http://schemas.openxmlformats.org/presentationml/2006/main">
   <p:cSld>
     <p:spTree>
@@ -33440,6 +32547,366 @@
     <p:extLst>
       <p:ext uri="{BB962C8B-B14F-4D97-AF65-F5344CB8AC3E}">
         <p14:creationId xmlns:p14="http://schemas.microsoft.com/office/powerpoint/2010/main" val="255839201"/>
+      </p:ext>
+    </p:extLst>
+  </p:cSld>
+  <p:clrMapOvr>
+    <a:masterClrMapping/>
+  </p:clrMapOvr>
+</p:sld>
+</file>
+
+<file path=ppt/slides/slide2.xml><?xml version="1.0" encoding="utf-8"?>
+<p:sld xmlns:a="http://schemas.openxmlformats.org/drawingml/2006/main" xmlns:r="http://schemas.openxmlformats.org/officeDocument/2006/relationships" xmlns:p="http://schemas.openxmlformats.org/presentationml/2006/main">
+  <p:cSld>
+    <p:spTree>
+      <p:nvGrpSpPr>
+        <p:cNvPr id="1" name=""/>
+        <p:cNvGrpSpPr/>
+        <p:nvPr/>
+      </p:nvGrpSpPr>
+      <p:grpSpPr>
+        <a:xfrm>
+          <a:off x="0" y="0"/>
+          <a:ext cx="0" cy="0"/>
+          <a:chOff x="0" y="0"/>
+          <a:chExt cx="0" cy="0"/>
+        </a:xfrm>
+      </p:grpSpPr>
+      <p:sp>
+        <p:nvSpPr>
+          <p:cNvPr id="2" name="Titre 1">
+            <a:extLst>
+              <a:ext uri="{FF2B5EF4-FFF2-40B4-BE49-F238E27FC236}">
+                <a16:creationId xmlns:a16="http://schemas.microsoft.com/office/drawing/2014/main" id="{FA19FF96-7DD0-0040-828B-A523CF6F7D83}"/>
+              </a:ext>
+            </a:extLst>
+          </p:cNvPr>
+          <p:cNvSpPr>
+            <a:spLocks noGrp="1"/>
+          </p:cNvSpPr>
+          <p:nvPr>
+            <p:ph type="ctrTitle"/>
+          </p:nvPr>
+        </p:nvSpPr>
+        <p:spPr/>
+        <p:txBody>
+          <a:bodyPr/>
+          <a:lstStyle/>
+          <a:p>
+            <a:r>
+              <a:rPr lang="fr-FR" dirty="0"/>
+              <a:t>Contents</a:t>
+            </a:r>
+          </a:p>
+        </p:txBody>
+      </p:sp>
+      <p:sp>
+        <p:nvSpPr>
+          <p:cNvPr id="3" name="Espace réservé du numéro de diapositive 2">
+            <a:extLst>
+              <a:ext uri="{FF2B5EF4-FFF2-40B4-BE49-F238E27FC236}">
+                <a16:creationId xmlns:a16="http://schemas.microsoft.com/office/drawing/2014/main" id="{41B4FBCF-B1E9-524A-BD98-8FCB15B72B21}"/>
+              </a:ext>
+            </a:extLst>
+          </p:cNvPr>
+          <p:cNvSpPr>
+            <a:spLocks noGrp="1"/>
+          </p:cNvSpPr>
+          <p:nvPr>
+            <p:ph type="sldNum" idx="19"/>
+          </p:nvPr>
+        </p:nvSpPr>
+        <p:spPr/>
+        <p:txBody>
+          <a:bodyPr/>
+          <a:lstStyle/>
+          <a:p>
+            <a:fld id="{00000000-1234-1234-1234-123412341234}" type="slidenum">
+              <a:rPr lang="uk-UA" smtClean="0"/>
+              <a:pPr/>
+              <a:t>2</a:t>
+            </a:fld>
+            <a:endParaRPr lang="uk-UA" dirty="0"/>
+          </a:p>
+        </p:txBody>
+      </p:sp>
+      <p:sp>
+        <p:nvSpPr>
+          <p:cNvPr id="5" name="Sous-titre 4">
+            <a:extLst>
+              <a:ext uri="{FF2B5EF4-FFF2-40B4-BE49-F238E27FC236}">
+                <a16:creationId xmlns:a16="http://schemas.microsoft.com/office/drawing/2014/main" id="{30997316-F276-E841-A8C1-A7469BDAC93D}"/>
+              </a:ext>
+            </a:extLst>
+          </p:cNvPr>
+          <p:cNvSpPr>
+            <a:spLocks noGrp="1"/>
+          </p:cNvSpPr>
+          <p:nvPr>
+            <p:ph type="subTitle" idx="1"/>
+          </p:nvPr>
+        </p:nvSpPr>
+        <p:spPr>
+          <a:xfrm>
+            <a:off x="968375" y="1441449"/>
+            <a:ext cx="588963" cy="3216251"/>
+          </a:xfrm>
+        </p:spPr>
+        <p:txBody>
+          <a:bodyPr/>
+          <a:lstStyle/>
+          <a:p>
+            <a:pPr>
+              <a:lnSpc>
+                <a:spcPct val="200000"/>
+              </a:lnSpc>
+            </a:pPr>
+            <a:r>
+              <a:rPr lang="fr-FR" dirty="0"/>
+              <a:t>01.</a:t>
+            </a:r>
+          </a:p>
+          <a:p>
+            <a:pPr>
+              <a:lnSpc>
+                <a:spcPct val="200000"/>
+              </a:lnSpc>
+            </a:pPr>
+            <a:r>
+              <a:rPr lang="fr-FR" dirty="0"/>
+              <a:t>02.</a:t>
+            </a:r>
+          </a:p>
+          <a:p>
+            <a:pPr>
+              <a:lnSpc>
+                <a:spcPct val="200000"/>
+              </a:lnSpc>
+            </a:pPr>
+            <a:r>
+              <a:rPr lang="fr-FR" dirty="0"/>
+              <a:t>03.</a:t>
+            </a:r>
+          </a:p>
+          <a:p>
+            <a:pPr>
+              <a:lnSpc>
+                <a:spcPct val="200000"/>
+              </a:lnSpc>
+            </a:pPr>
+            <a:r>
+              <a:rPr lang="fr-FR" dirty="0"/>
+              <a:t>04.</a:t>
+            </a:r>
+          </a:p>
+        </p:txBody>
+      </p:sp>
+      <p:sp>
+        <p:nvSpPr>
+          <p:cNvPr id="6" name="Espace réservé du texte 5">
+            <a:extLst>
+              <a:ext uri="{FF2B5EF4-FFF2-40B4-BE49-F238E27FC236}">
+                <a16:creationId xmlns:a16="http://schemas.microsoft.com/office/drawing/2014/main" id="{63FDBA37-F74B-7F40-9B6B-6CE160C0EE6C}"/>
+              </a:ext>
+            </a:extLst>
+          </p:cNvPr>
+          <p:cNvSpPr>
+            <a:spLocks noGrp="1"/>
+          </p:cNvSpPr>
+          <p:nvPr>
+            <p:ph type="body" sz="quarter" idx="14"/>
+          </p:nvPr>
+        </p:nvSpPr>
+        <p:spPr/>
+        <p:txBody>
+          <a:bodyPr/>
+          <a:lstStyle/>
+          <a:p>
+            <a:pPr>
+              <a:lnSpc>
+                <a:spcPct val="200000"/>
+              </a:lnSpc>
+            </a:pPr>
+            <a:r>
+              <a:rPr lang="fr-FR" dirty="0"/>
+              <a:t>Principles of the functional paradigm</a:t>
+            </a:r>
+          </a:p>
+          <a:p>
+            <a:pPr>
+              <a:lnSpc>
+                <a:spcPct val="200000"/>
+              </a:lnSpc>
+            </a:pPr>
+            <a:r>
+              <a:rPr lang="fr-FR" dirty="0"/>
+              <a:t>Application of FP principles in JS</a:t>
+            </a:r>
+          </a:p>
+          <a:p>
+            <a:pPr>
+              <a:lnSpc>
+                <a:spcPct val="200000"/>
+              </a:lnSpc>
+            </a:pPr>
+            <a:r>
+              <a:rPr lang="fr-FR" dirty="0"/>
+              <a:t>Isolation of side effects</a:t>
+            </a:r>
+          </a:p>
+          <a:p>
+            <a:pPr>
+              <a:lnSpc>
+                <a:spcPct val="200000"/>
+              </a:lnSpc>
+            </a:pPr>
+            <a:r>
+              <a:rPr lang="fr-FR" dirty="0"/>
+              <a:t>Some helpful tools</a:t>
+            </a:r>
+          </a:p>
+          <a:p>
+            <a:pPr>
+              <a:lnSpc>
+                <a:spcPct val="200000"/>
+              </a:lnSpc>
+            </a:pPr>
+            <a:endParaRPr lang="fr-FR" dirty="0"/>
+          </a:p>
+        </p:txBody>
+      </p:sp>
+      <p:sp>
+        <p:nvSpPr>
+          <p:cNvPr id="7" name="Espace réservé du texte 6">
+            <a:extLst>
+              <a:ext uri="{FF2B5EF4-FFF2-40B4-BE49-F238E27FC236}">
+                <a16:creationId xmlns:a16="http://schemas.microsoft.com/office/drawing/2014/main" id="{80C71FCD-0534-EC4B-BE13-E4A579365A5E}"/>
+              </a:ext>
+            </a:extLst>
+          </p:cNvPr>
+          <p:cNvSpPr>
+            <a:spLocks noGrp="1"/>
+          </p:cNvSpPr>
+          <p:nvPr>
+            <p:ph type="body" sz="quarter" idx="18"/>
+          </p:nvPr>
+        </p:nvSpPr>
+        <p:spPr>
+          <a:xfrm>
+            <a:off x="6850064" y="1467755"/>
+            <a:ext cx="1325562" cy="3507480"/>
+          </a:xfrm>
+        </p:spPr>
+        <p:txBody>
+          <a:bodyPr/>
+          <a:lstStyle/>
+          <a:p>
+            <a:pPr>
+              <a:lnSpc>
+                <a:spcPct val="250000"/>
+              </a:lnSpc>
+            </a:pPr>
+            <a:r>
+              <a:rPr lang="fr-FR" dirty="0"/>
+              <a:t> p.03–06</a:t>
+            </a:r>
+          </a:p>
+          <a:p>
+            <a:pPr>
+              <a:lnSpc>
+                <a:spcPct val="250000"/>
+              </a:lnSpc>
+            </a:pPr>
+            <a:r>
+              <a:rPr lang="fr-FR" dirty="0"/>
+              <a:t>  p.07–12</a:t>
+            </a:r>
+          </a:p>
+          <a:p>
+            <a:pPr>
+              <a:lnSpc>
+                <a:spcPct val="250000"/>
+              </a:lnSpc>
+            </a:pPr>
+            <a:r>
+              <a:rPr lang="fr-FR" dirty="0"/>
+              <a:t>  p.13–17</a:t>
+            </a:r>
+          </a:p>
+          <a:p>
+            <a:pPr>
+              <a:lnSpc>
+                <a:spcPct val="250000"/>
+              </a:lnSpc>
+            </a:pPr>
+            <a:r>
+              <a:rPr lang="fr-FR" dirty="0"/>
+              <a:t>p.18–19</a:t>
+            </a:r>
+          </a:p>
+        </p:txBody>
+      </p:sp>
+      <p:sp>
+        <p:nvSpPr>
+          <p:cNvPr id="18" name="Espace réservé du pied de page 17">
+            <a:extLst>
+              <a:ext uri="{FF2B5EF4-FFF2-40B4-BE49-F238E27FC236}">
+                <a16:creationId xmlns:a16="http://schemas.microsoft.com/office/drawing/2014/main" id="{25377960-2AE1-9843-8D95-33879CD98993}"/>
+              </a:ext>
+            </a:extLst>
+          </p:cNvPr>
+          <p:cNvSpPr>
+            <a:spLocks noGrp="1"/>
+          </p:cNvSpPr>
+          <p:nvPr>
+            <p:ph type="ftr" sz="quarter" idx="20"/>
+          </p:nvPr>
+        </p:nvSpPr>
+        <p:spPr/>
+        <p:txBody>
+          <a:bodyPr/>
+          <a:lstStyle/>
+          <a:p>
+            <a:r>
+              <a:rPr lang="fr-FR" dirty="0" err="1"/>
+              <a:t>Functional</a:t>
+            </a:r>
+            <a:r>
+              <a:rPr lang="fr-FR" dirty="0"/>
+              <a:t> </a:t>
+            </a:r>
+            <a:r>
+              <a:rPr lang="fr-FR" dirty="0" err="1"/>
+              <a:t>programming</a:t>
+            </a:r>
+            <a:r>
+              <a:rPr lang="fr-FR" dirty="0"/>
+              <a:t> in the JS </a:t>
+            </a:r>
+            <a:r>
+              <a:rPr lang="fr-FR" dirty="0" err="1"/>
+              <a:t>ecosystem</a:t>
+            </a:r>
+            <a:r>
+              <a:rPr lang="fr-FR" dirty="0"/>
+              <a:t> • v1 • 06/02/2020• </a:t>
+            </a:r>
+            <a:r>
+              <a:rPr lang="fr-FR" dirty="0" err="1"/>
+              <a:t>ekino</a:t>
+            </a:r>
+            <a:r>
+              <a:rPr lang="fr-FR" dirty="0"/>
+              <a:t> • Confidentiel</a:t>
+            </a:r>
+          </a:p>
+        </p:txBody>
+      </p:sp>
+    </p:spTree>
+    <p:extLst>
+      <p:ext uri="{BB962C8B-B14F-4D97-AF65-F5344CB8AC3E}">
+        <p14:creationId xmlns:p14="http://schemas.microsoft.com/office/powerpoint/2010/main" val="2391288875"/>
       </p:ext>
     </p:extLst>
   </p:cSld>

</xml_diff>